<commit_message>
Updates 3rd day slides and resources page.
</commit_message>
<xml_diff>
--- a/slides/03_CS0447_Data-Representation.pptx
+++ b/slides/03_CS0447_Data-Representation.pptx
@@ -14084,6 +14084,457 @@
   <p:clrMapOvr>
     <a:masterClrMapping/>
   </p:clrMapOvr>
+  <p:timing>
+    <p:tnLst>
+      <p:par>
+        <p:cTn id="1" dur="indefinite" restart="never" nodeType="tmRoot">
+          <p:childTnLst>
+            <p:seq concurrent="1" nextAc="seek">
+              <p:cTn id="2" dur="indefinite" nodeType="mainSeq">
+                <p:childTnLst>
+                  <p:par>
+                    <p:cTn id="3" fill="hold">
+                      <p:stCondLst>
+                        <p:cond delay="indefinite"/>
+                      </p:stCondLst>
+                      <p:childTnLst>
+                        <p:par>
+                          <p:cTn id="4" fill="hold">
+                            <p:stCondLst>
+                              <p:cond delay="0"/>
+                            </p:stCondLst>
+                            <p:childTnLst>
+                              <p:par>
+                                <p:cTn id="5" presetID="1" presetClass="entr" presetSubtype="0" fill="hold" grpId="0" nodeType="clickEffect">
+                                  <p:stCondLst>
+                                    <p:cond delay="0"/>
+                                  </p:stCondLst>
+                                  <p:childTnLst>
+                                    <p:set>
+                                      <p:cBhvr>
+                                        <p:cTn id="6" dur="1" fill="hold">
+                                          <p:stCondLst>
+                                            <p:cond delay="0"/>
+                                          </p:stCondLst>
+                                        </p:cTn>
+                                        <p:tgtEl>
+                                          <p:spTgt spid="6">
+                                            <p:txEl>
+                                              <p:pRg st="0" end="0"/>
+                                            </p:txEl>
+                                          </p:spTgt>
+                                        </p:tgtEl>
+                                        <p:attrNameLst>
+                                          <p:attrName>style.visibility</p:attrName>
+                                        </p:attrNameLst>
+                                      </p:cBhvr>
+                                      <p:to>
+                                        <p:strVal val="visible"/>
+                                      </p:to>
+                                    </p:set>
+                                  </p:childTnLst>
+                                </p:cTn>
+                              </p:par>
+                            </p:childTnLst>
+                          </p:cTn>
+                        </p:par>
+                      </p:childTnLst>
+                    </p:cTn>
+                  </p:par>
+                  <p:par>
+                    <p:cTn id="7" fill="hold">
+                      <p:stCondLst>
+                        <p:cond delay="indefinite"/>
+                      </p:stCondLst>
+                      <p:childTnLst>
+                        <p:par>
+                          <p:cTn id="8" fill="hold">
+                            <p:stCondLst>
+                              <p:cond delay="0"/>
+                            </p:stCondLst>
+                            <p:childTnLst>
+                              <p:par>
+                                <p:cTn id="9" presetID="1" presetClass="entr" presetSubtype="0" fill="hold" grpId="0" nodeType="clickEffect">
+                                  <p:stCondLst>
+                                    <p:cond delay="0"/>
+                                  </p:stCondLst>
+                                  <p:childTnLst>
+                                    <p:set>
+                                      <p:cBhvr>
+                                        <p:cTn id="10" dur="1" fill="hold">
+                                          <p:stCondLst>
+                                            <p:cond delay="0"/>
+                                          </p:stCondLst>
+                                        </p:cTn>
+                                        <p:tgtEl>
+                                          <p:spTgt spid="6">
+                                            <p:txEl>
+                                              <p:pRg st="1" end="1"/>
+                                            </p:txEl>
+                                          </p:spTgt>
+                                        </p:tgtEl>
+                                        <p:attrNameLst>
+                                          <p:attrName>style.visibility</p:attrName>
+                                        </p:attrNameLst>
+                                      </p:cBhvr>
+                                      <p:to>
+                                        <p:strVal val="visible"/>
+                                      </p:to>
+                                    </p:set>
+                                  </p:childTnLst>
+                                </p:cTn>
+                              </p:par>
+                              <p:par>
+                                <p:cTn id="11" presetID="1" presetClass="entr" presetSubtype="0" fill="hold" grpId="0" nodeType="withEffect">
+                                  <p:stCondLst>
+                                    <p:cond delay="0"/>
+                                  </p:stCondLst>
+                                  <p:childTnLst>
+                                    <p:set>
+                                      <p:cBhvr>
+                                        <p:cTn id="12" dur="1" fill="hold">
+                                          <p:stCondLst>
+                                            <p:cond delay="0"/>
+                                          </p:stCondLst>
+                                        </p:cTn>
+                                        <p:tgtEl>
+                                          <p:spTgt spid="6">
+                                            <p:txEl>
+                                              <p:pRg st="2" end="2"/>
+                                            </p:txEl>
+                                          </p:spTgt>
+                                        </p:tgtEl>
+                                        <p:attrNameLst>
+                                          <p:attrName>style.visibility</p:attrName>
+                                        </p:attrNameLst>
+                                      </p:cBhvr>
+                                      <p:to>
+                                        <p:strVal val="visible"/>
+                                      </p:to>
+                                    </p:set>
+                                  </p:childTnLst>
+                                </p:cTn>
+                              </p:par>
+                            </p:childTnLst>
+                          </p:cTn>
+                        </p:par>
+                      </p:childTnLst>
+                    </p:cTn>
+                  </p:par>
+                  <p:par>
+                    <p:cTn id="13" fill="hold">
+                      <p:stCondLst>
+                        <p:cond delay="indefinite"/>
+                      </p:stCondLst>
+                      <p:childTnLst>
+                        <p:par>
+                          <p:cTn id="14" fill="hold">
+                            <p:stCondLst>
+                              <p:cond delay="0"/>
+                            </p:stCondLst>
+                            <p:childTnLst>
+                              <p:par>
+                                <p:cTn id="15" presetID="1" presetClass="entr" presetSubtype="0" fill="hold" grpId="0" nodeType="clickEffect">
+                                  <p:stCondLst>
+                                    <p:cond delay="0"/>
+                                  </p:stCondLst>
+                                  <p:childTnLst>
+                                    <p:set>
+                                      <p:cBhvr>
+                                        <p:cTn id="16" dur="1" fill="hold">
+                                          <p:stCondLst>
+                                            <p:cond delay="0"/>
+                                          </p:stCondLst>
+                                        </p:cTn>
+                                        <p:tgtEl>
+                                          <p:spTgt spid="6">
+                                            <p:txEl>
+                                              <p:pRg st="3" end="3"/>
+                                            </p:txEl>
+                                          </p:spTgt>
+                                        </p:tgtEl>
+                                        <p:attrNameLst>
+                                          <p:attrName>style.visibility</p:attrName>
+                                        </p:attrNameLst>
+                                      </p:cBhvr>
+                                      <p:to>
+                                        <p:strVal val="visible"/>
+                                      </p:to>
+                                    </p:set>
+                                  </p:childTnLst>
+                                </p:cTn>
+                              </p:par>
+                              <p:par>
+                                <p:cTn id="17" presetID="1" presetClass="entr" presetSubtype="0" fill="hold" grpId="0" nodeType="withEffect">
+                                  <p:stCondLst>
+                                    <p:cond delay="0"/>
+                                  </p:stCondLst>
+                                  <p:childTnLst>
+                                    <p:set>
+                                      <p:cBhvr>
+                                        <p:cTn id="18" dur="1" fill="hold">
+                                          <p:stCondLst>
+                                            <p:cond delay="0"/>
+                                          </p:stCondLst>
+                                        </p:cTn>
+                                        <p:tgtEl>
+                                          <p:spTgt spid="6">
+                                            <p:txEl>
+                                              <p:pRg st="4" end="4"/>
+                                            </p:txEl>
+                                          </p:spTgt>
+                                        </p:tgtEl>
+                                        <p:attrNameLst>
+                                          <p:attrName>style.visibility</p:attrName>
+                                        </p:attrNameLst>
+                                      </p:cBhvr>
+                                      <p:to>
+                                        <p:strVal val="visible"/>
+                                      </p:to>
+                                    </p:set>
+                                  </p:childTnLst>
+                                </p:cTn>
+                              </p:par>
+                            </p:childTnLst>
+                          </p:cTn>
+                        </p:par>
+                      </p:childTnLst>
+                    </p:cTn>
+                  </p:par>
+                  <p:par>
+                    <p:cTn id="19" fill="hold">
+                      <p:stCondLst>
+                        <p:cond delay="indefinite"/>
+                      </p:stCondLst>
+                      <p:childTnLst>
+                        <p:par>
+                          <p:cTn id="20" fill="hold">
+                            <p:stCondLst>
+                              <p:cond delay="0"/>
+                            </p:stCondLst>
+                            <p:childTnLst>
+                              <p:par>
+                                <p:cTn id="21" presetID="1" presetClass="entr" presetSubtype="0" fill="hold" grpId="0" nodeType="clickEffect">
+                                  <p:stCondLst>
+                                    <p:cond delay="0"/>
+                                  </p:stCondLst>
+                                  <p:childTnLst>
+                                    <p:set>
+                                      <p:cBhvr>
+                                        <p:cTn id="22" dur="1" fill="hold">
+                                          <p:stCondLst>
+                                            <p:cond delay="0"/>
+                                          </p:stCondLst>
+                                        </p:cTn>
+                                        <p:tgtEl>
+                                          <p:spTgt spid="6">
+                                            <p:txEl>
+                                              <p:pRg st="5" end="5"/>
+                                            </p:txEl>
+                                          </p:spTgt>
+                                        </p:tgtEl>
+                                        <p:attrNameLst>
+                                          <p:attrName>style.visibility</p:attrName>
+                                        </p:attrNameLst>
+                                      </p:cBhvr>
+                                      <p:to>
+                                        <p:strVal val="visible"/>
+                                      </p:to>
+                                    </p:set>
+                                  </p:childTnLst>
+                                </p:cTn>
+                              </p:par>
+                            </p:childTnLst>
+                          </p:cTn>
+                        </p:par>
+                      </p:childTnLst>
+                    </p:cTn>
+                  </p:par>
+                  <p:par>
+                    <p:cTn id="23" fill="hold">
+                      <p:stCondLst>
+                        <p:cond delay="indefinite"/>
+                      </p:stCondLst>
+                      <p:childTnLst>
+                        <p:par>
+                          <p:cTn id="24" fill="hold">
+                            <p:stCondLst>
+                              <p:cond delay="0"/>
+                            </p:stCondLst>
+                            <p:childTnLst>
+                              <p:par>
+                                <p:cTn id="25" presetID="1" presetClass="entr" presetSubtype="0" fill="hold" grpId="0" nodeType="clickEffect">
+                                  <p:stCondLst>
+                                    <p:cond delay="0"/>
+                                  </p:stCondLst>
+                                  <p:childTnLst>
+                                    <p:set>
+                                      <p:cBhvr>
+                                        <p:cTn id="26" dur="1" fill="hold">
+                                          <p:stCondLst>
+                                            <p:cond delay="0"/>
+                                          </p:stCondLst>
+                                        </p:cTn>
+                                        <p:tgtEl>
+                                          <p:spTgt spid="6">
+                                            <p:txEl>
+                                              <p:pRg st="6" end="6"/>
+                                            </p:txEl>
+                                          </p:spTgt>
+                                        </p:tgtEl>
+                                        <p:attrNameLst>
+                                          <p:attrName>style.visibility</p:attrName>
+                                        </p:attrNameLst>
+                                      </p:cBhvr>
+                                      <p:to>
+                                        <p:strVal val="visible"/>
+                                      </p:to>
+                                    </p:set>
+                                  </p:childTnLst>
+                                </p:cTn>
+                              </p:par>
+                              <p:par>
+                                <p:cTn id="27" presetID="1" presetClass="entr" presetSubtype="0" fill="hold" grpId="0" nodeType="withEffect">
+                                  <p:stCondLst>
+                                    <p:cond delay="0"/>
+                                  </p:stCondLst>
+                                  <p:childTnLst>
+                                    <p:set>
+                                      <p:cBhvr>
+                                        <p:cTn id="28" dur="1" fill="hold">
+                                          <p:stCondLst>
+                                            <p:cond delay="0"/>
+                                          </p:stCondLst>
+                                        </p:cTn>
+                                        <p:tgtEl>
+                                          <p:spTgt spid="6">
+                                            <p:txEl>
+                                              <p:pRg st="7" end="7"/>
+                                            </p:txEl>
+                                          </p:spTgt>
+                                        </p:tgtEl>
+                                        <p:attrNameLst>
+                                          <p:attrName>style.visibility</p:attrName>
+                                        </p:attrNameLst>
+                                      </p:cBhvr>
+                                      <p:to>
+                                        <p:strVal val="visible"/>
+                                      </p:to>
+                                    </p:set>
+                                  </p:childTnLst>
+                                </p:cTn>
+                              </p:par>
+                            </p:childTnLst>
+                          </p:cTn>
+                        </p:par>
+                      </p:childTnLst>
+                    </p:cTn>
+                  </p:par>
+                  <p:par>
+                    <p:cTn id="29" fill="hold">
+                      <p:stCondLst>
+                        <p:cond delay="indefinite"/>
+                      </p:stCondLst>
+                      <p:childTnLst>
+                        <p:par>
+                          <p:cTn id="30" fill="hold">
+                            <p:stCondLst>
+                              <p:cond delay="0"/>
+                            </p:stCondLst>
+                            <p:childTnLst>
+                              <p:par>
+                                <p:cTn id="31" presetID="1" presetClass="entr" presetSubtype="0" fill="hold" grpId="0" nodeType="clickEffect">
+                                  <p:stCondLst>
+                                    <p:cond delay="0"/>
+                                  </p:stCondLst>
+                                  <p:childTnLst>
+                                    <p:set>
+                                      <p:cBhvr>
+                                        <p:cTn id="32" dur="1" fill="hold">
+                                          <p:stCondLst>
+                                            <p:cond delay="0"/>
+                                          </p:stCondLst>
+                                        </p:cTn>
+                                        <p:tgtEl>
+                                          <p:spTgt spid="6">
+                                            <p:txEl>
+                                              <p:pRg st="8" end="8"/>
+                                            </p:txEl>
+                                          </p:spTgt>
+                                        </p:tgtEl>
+                                        <p:attrNameLst>
+                                          <p:attrName>style.visibility</p:attrName>
+                                        </p:attrNameLst>
+                                      </p:cBhvr>
+                                      <p:to>
+                                        <p:strVal val="visible"/>
+                                      </p:to>
+                                    </p:set>
+                                  </p:childTnLst>
+                                </p:cTn>
+                              </p:par>
+                              <p:par>
+                                <p:cTn id="33" presetID="1" presetClass="entr" presetSubtype="0" fill="hold" grpId="0" nodeType="withEffect">
+                                  <p:stCondLst>
+                                    <p:cond delay="0"/>
+                                  </p:stCondLst>
+                                  <p:childTnLst>
+                                    <p:set>
+                                      <p:cBhvr>
+                                        <p:cTn id="34" dur="1" fill="hold">
+                                          <p:stCondLst>
+                                            <p:cond delay="0"/>
+                                          </p:stCondLst>
+                                        </p:cTn>
+                                        <p:tgtEl>
+                                          <p:spTgt spid="6">
+                                            <p:txEl>
+                                              <p:pRg st="9" end="9"/>
+                                            </p:txEl>
+                                          </p:spTgt>
+                                        </p:tgtEl>
+                                        <p:attrNameLst>
+                                          <p:attrName>style.visibility</p:attrName>
+                                        </p:attrNameLst>
+                                      </p:cBhvr>
+                                      <p:to>
+                                        <p:strVal val="visible"/>
+                                      </p:to>
+                                    </p:set>
+                                  </p:childTnLst>
+                                </p:cTn>
+                              </p:par>
+                            </p:childTnLst>
+                          </p:cTn>
+                        </p:par>
+                      </p:childTnLst>
+                    </p:cTn>
+                  </p:par>
+                </p:childTnLst>
+              </p:cTn>
+              <p:prevCondLst>
+                <p:cond evt="onPrev" delay="0">
+                  <p:tgtEl>
+                    <p:sldTgt/>
+                  </p:tgtEl>
+                </p:cond>
+              </p:prevCondLst>
+              <p:nextCondLst>
+                <p:cond evt="onNext" delay="0">
+                  <p:tgtEl>
+                    <p:sldTgt/>
+                  </p:tgtEl>
+                </p:cond>
+              </p:nextCondLst>
+            </p:seq>
+          </p:childTnLst>
+        </p:cTn>
+      </p:par>
+    </p:tnLst>
+    <p:bldLst>
+      <p:bldP spid="6" grpId="0" build="p"/>
+    </p:bldLst>
+  </p:timing>
 </p:sld>
 </file>
 
@@ -14268,6 +14719,382 @@
   <p:clrMapOvr>
     <a:masterClrMapping/>
   </p:clrMapOvr>
+  <p:timing>
+    <p:tnLst>
+      <p:par>
+        <p:cTn id="1" dur="indefinite" restart="never" nodeType="tmRoot">
+          <p:childTnLst>
+            <p:seq concurrent="1" nextAc="seek">
+              <p:cTn id="2" dur="indefinite" nodeType="mainSeq">
+                <p:childTnLst>
+                  <p:par>
+                    <p:cTn id="3" fill="hold">
+                      <p:stCondLst>
+                        <p:cond delay="indefinite"/>
+                      </p:stCondLst>
+                      <p:childTnLst>
+                        <p:par>
+                          <p:cTn id="4" fill="hold">
+                            <p:stCondLst>
+                              <p:cond delay="0"/>
+                            </p:stCondLst>
+                            <p:childTnLst>
+                              <p:par>
+                                <p:cTn id="5" presetID="1" presetClass="entr" presetSubtype="0" fill="hold" grpId="0" nodeType="clickEffect">
+                                  <p:stCondLst>
+                                    <p:cond delay="0"/>
+                                  </p:stCondLst>
+                                  <p:childTnLst>
+                                    <p:set>
+                                      <p:cBhvr>
+                                        <p:cTn id="6" dur="1" fill="hold">
+                                          <p:stCondLst>
+                                            <p:cond delay="0"/>
+                                          </p:stCondLst>
+                                        </p:cTn>
+                                        <p:tgtEl>
+                                          <p:spTgt spid="5">
+                                            <p:txEl>
+                                              <p:pRg st="0" end="0"/>
+                                            </p:txEl>
+                                          </p:spTgt>
+                                        </p:tgtEl>
+                                        <p:attrNameLst>
+                                          <p:attrName>style.visibility</p:attrName>
+                                        </p:attrNameLst>
+                                      </p:cBhvr>
+                                      <p:to>
+                                        <p:strVal val="visible"/>
+                                      </p:to>
+                                    </p:set>
+                                  </p:childTnLst>
+                                </p:cTn>
+                              </p:par>
+                            </p:childTnLst>
+                          </p:cTn>
+                        </p:par>
+                      </p:childTnLst>
+                    </p:cTn>
+                  </p:par>
+                  <p:par>
+                    <p:cTn id="7" fill="hold">
+                      <p:stCondLst>
+                        <p:cond delay="indefinite"/>
+                      </p:stCondLst>
+                      <p:childTnLst>
+                        <p:par>
+                          <p:cTn id="8" fill="hold">
+                            <p:stCondLst>
+                              <p:cond delay="0"/>
+                            </p:stCondLst>
+                            <p:childTnLst>
+                              <p:par>
+                                <p:cTn id="9" presetID="1" presetClass="entr" presetSubtype="0" fill="hold" grpId="0" nodeType="clickEffect">
+                                  <p:stCondLst>
+                                    <p:cond delay="0"/>
+                                  </p:stCondLst>
+                                  <p:childTnLst>
+                                    <p:set>
+                                      <p:cBhvr>
+                                        <p:cTn id="10" dur="1" fill="hold">
+                                          <p:stCondLst>
+                                            <p:cond delay="0"/>
+                                          </p:stCondLst>
+                                        </p:cTn>
+                                        <p:tgtEl>
+                                          <p:spTgt spid="5">
+                                            <p:txEl>
+                                              <p:pRg st="1" end="1"/>
+                                            </p:txEl>
+                                          </p:spTgt>
+                                        </p:tgtEl>
+                                        <p:attrNameLst>
+                                          <p:attrName>style.visibility</p:attrName>
+                                        </p:attrNameLst>
+                                      </p:cBhvr>
+                                      <p:to>
+                                        <p:strVal val="visible"/>
+                                      </p:to>
+                                    </p:set>
+                                  </p:childTnLst>
+                                </p:cTn>
+                              </p:par>
+                            </p:childTnLst>
+                          </p:cTn>
+                        </p:par>
+                      </p:childTnLst>
+                    </p:cTn>
+                  </p:par>
+                  <p:par>
+                    <p:cTn id="11" fill="hold">
+                      <p:stCondLst>
+                        <p:cond delay="indefinite"/>
+                      </p:stCondLst>
+                      <p:childTnLst>
+                        <p:par>
+                          <p:cTn id="12" fill="hold">
+                            <p:stCondLst>
+                              <p:cond delay="0"/>
+                            </p:stCondLst>
+                            <p:childTnLst>
+                              <p:par>
+                                <p:cTn id="13" presetID="1" presetClass="entr" presetSubtype="0" fill="hold" grpId="0" nodeType="clickEffect">
+                                  <p:stCondLst>
+                                    <p:cond delay="0"/>
+                                  </p:stCondLst>
+                                  <p:childTnLst>
+                                    <p:set>
+                                      <p:cBhvr>
+                                        <p:cTn id="14" dur="1" fill="hold">
+                                          <p:stCondLst>
+                                            <p:cond delay="0"/>
+                                          </p:stCondLst>
+                                        </p:cTn>
+                                        <p:tgtEl>
+                                          <p:spTgt spid="5">
+                                            <p:txEl>
+                                              <p:pRg st="2" end="2"/>
+                                            </p:txEl>
+                                          </p:spTgt>
+                                        </p:tgtEl>
+                                        <p:attrNameLst>
+                                          <p:attrName>style.visibility</p:attrName>
+                                        </p:attrNameLst>
+                                      </p:cBhvr>
+                                      <p:to>
+                                        <p:strVal val="visible"/>
+                                      </p:to>
+                                    </p:set>
+                                  </p:childTnLst>
+                                </p:cTn>
+                              </p:par>
+                            </p:childTnLst>
+                          </p:cTn>
+                        </p:par>
+                      </p:childTnLst>
+                    </p:cTn>
+                  </p:par>
+                  <p:par>
+                    <p:cTn id="15" fill="hold">
+                      <p:stCondLst>
+                        <p:cond delay="indefinite"/>
+                      </p:stCondLst>
+                      <p:childTnLst>
+                        <p:par>
+                          <p:cTn id="16" fill="hold">
+                            <p:stCondLst>
+                              <p:cond delay="0"/>
+                            </p:stCondLst>
+                            <p:childTnLst>
+                              <p:par>
+                                <p:cTn id="17" presetID="1" presetClass="entr" presetSubtype="0" fill="hold" grpId="0" nodeType="clickEffect">
+                                  <p:stCondLst>
+                                    <p:cond delay="0"/>
+                                  </p:stCondLst>
+                                  <p:childTnLst>
+                                    <p:set>
+                                      <p:cBhvr>
+                                        <p:cTn id="18" dur="1" fill="hold">
+                                          <p:stCondLst>
+                                            <p:cond delay="0"/>
+                                          </p:stCondLst>
+                                        </p:cTn>
+                                        <p:tgtEl>
+                                          <p:spTgt spid="5">
+                                            <p:txEl>
+                                              <p:pRg st="4" end="4"/>
+                                            </p:txEl>
+                                          </p:spTgt>
+                                        </p:tgtEl>
+                                        <p:attrNameLst>
+                                          <p:attrName>style.visibility</p:attrName>
+                                        </p:attrNameLst>
+                                      </p:cBhvr>
+                                      <p:to>
+                                        <p:strVal val="visible"/>
+                                      </p:to>
+                                    </p:set>
+                                  </p:childTnLst>
+                                </p:cTn>
+                              </p:par>
+                            </p:childTnLst>
+                          </p:cTn>
+                        </p:par>
+                      </p:childTnLst>
+                    </p:cTn>
+                  </p:par>
+                  <p:par>
+                    <p:cTn id="19" fill="hold">
+                      <p:stCondLst>
+                        <p:cond delay="indefinite"/>
+                      </p:stCondLst>
+                      <p:childTnLst>
+                        <p:par>
+                          <p:cTn id="20" fill="hold">
+                            <p:stCondLst>
+                              <p:cond delay="0"/>
+                            </p:stCondLst>
+                            <p:childTnLst>
+                              <p:par>
+                                <p:cTn id="21" presetID="1" presetClass="entr" presetSubtype="0" fill="hold" grpId="0" nodeType="clickEffect">
+                                  <p:stCondLst>
+                                    <p:cond delay="0"/>
+                                  </p:stCondLst>
+                                  <p:childTnLst>
+                                    <p:set>
+                                      <p:cBhvr>
+                                        <p:cTn id="22" dur="1" fill="hold">
+                                          <p:stCondLst>
+                                            <p:cond delay="0"/>
+                                          </p:stCondLst>
+                                        </p:cTn>
+                                        <p:tgtEl>
+                                          <p:spTgt spid="5">
+                                            <p:txEl>
+                                              <p:pRg st="6" end="6"/>
+                                            </p:txEl>
+                                          </p:spTgt>
+                                        </p:tgtEl>
+                                        <p:attrNameLst>
+                                          <p:attrName>style.visibility</p:attrName>
+                                        </p:attrNameLst>
+                                      </p:cBhvr>
+                                      <p:to>
+                                        <p:strVal val="visible"/>
+                                      </p:to>
+                                    </p:set>
+                                  </p:childTnLst>
+                                </p:cTn>
+                              </p:par>
+                            </p:childTnLst>
+                          </p:cTn>
+                        </p:par>
+                      </p:childTnLst>
+                    </p:cTn>
+                  </p:par>
+                  <p:par>
+                    <p:cTn id="23" fill="hold">
+                      <p:stCondLst>
+                        <p:cond delay="indefinite"/>
+                      </p:stCondLst>
+                      <p:childTnLst>
+                        <p:par>
+                          <p:cTn id="24" fill="hold">
+                            <p:stCondLst>
+                              <p:cond delay="0"/>
+                            </p:stCondLst>
+                            <p:childTnLst>
+                              <p:par>
+                                <p:cTn id="25" presetID="1" presetClass="entr" presetSubtype="0" fill="hold" grpId="0" nodeType="clickEffect">
+                                  <p:stCondLst>
+                                    <p:cond delay="0"/>
+                                  </p:stCondLst>
+                                  <p:childTnLst>
+                                    <p:set>
+                                      <p:cBhvr>
+                                        <p:cTn id="26" dur="1" fill="hold">
+                                          <p:stCondLst>
+                                            <p:cond delay="0"/>
+                                          </p:stCondLst>
+                                        </p:cTn>
+                                        <p:tgtEl>
+                                          <p:spTgt spid="5">
+                                            <p:txEl>
+                                              <p:pRg st="8" end="8"/>
+                                            </p:txEl>
+                                          </p:spTgt>
+                                        </p:tgtEl>
+                                        <p:attrNameLst>
+                                          <p:attrName>style.visibility</p:attrName>
+                                        </p:attrNameLst>
+                                      </p:cBhvr>
+                                      <p:to>
+                                        <p:strVal val="visible"/>
+                                      </p:to>
+                                    </p:set>
+                                  </p:childTnLst>
+                                </p:cTn>
+                              </p:par>
+                            </p:childTnLst>
+                          </p:cTn>
+                        </p:par>
+                      </p:childTnLst>
+                    </p:cTn>
+                  </p:par>
+                  <p:par>
+                    <p:cTn id="27" fill="hold">
+                      <p:stCondLst>
+                        <p:cond delay="indefinite"/>
+                      </p:stCondLst>
+                      <p:childTnLst>
+                        <p:par>
+                          <p:cTn id="28" fill="hold">
+                            <p:stCondLst>
+                              <p:cond delay="0"/>
+                            </p:stCondLst>
+                            <p:childTnLst>
+                              <p:par>
+                                <p:cTn id="29" presetID="1" presetClass="entr" presetSubtype="0" fill="hold" grpId="0" nodeType="clickEffect">
+                                  <p:stCondLst>
+                                    <p:cond delay="0"/>
+                                  </p:stCondLst>
+                                  <p:childTnLst>
+                                    <p:set>
+                                      <p:cBhvr>
+                                        <p:cTn id="30" dur="1" fill="hold">
+                                          <p:stCondLst>
+                                            <p:cond delay="0"/>
+                                          </p:stCondLst>
+                                        </p:cTn>
+                                        <p:tgtEl>
+                                          <p:spTgt spid="5">
+                                            <p:txEl>
+                                              <p:pRg st="9" end="9"/>
+                                            </p:txEl>
+                                          </p:spTgt>
+                                        </p:tgtEl>
+                                        <p:attrNameLst>
+                                          <p:attrName>style.visibility</p:attrName>
+                                        </p:attrNameLst>
+                                      </p:cBhvr>
+                                      <p:to>
+                                        <p:strVal val="visible"/>
+                                      </p:to>
+                                    </p:set>
+                                  </p:childTnLst>
+                                </p:cTn>
+                              </p:par>
+                            </p:childTnLst>
+                          </p:cTn>
+                        </p:par>
+                      </p:childTnLst>
+                    </p:cTn>
+                  </p:par>
+                </p:childTnLst>
+              </p:cTn>
+              <p:prevCondLst>
+                <p:cond evt="onPrev" delay="0">
+                  <p:tgtEl>
+                    <p:sldTgt/>
+                  </p:tgtEl>
+                </p:cond>
+              </p:prevCondLst>
+              <p:nextCondLst>
+                <p:cond evt="onNext" delay="0">
+                  <p:tgtEl>
+                    <p:sldTgt/>
+                  </p:tgtEl>
+                </p:cond>
+              </p:nextCondLst>
+            </p:seq>
+          </p:childTnLst>
+        </p:cTn>
+      </p:par>
+    </p:tnLst>
+    <p:bldLst>
+      <p:bldP spid="5" grpId="0" uiExpand="1" build="p"/>
+    </p:bldLst>
+  </p:timing>
 </p:sld>
 </file>
 
@@ -16168,7 +16995,7 @@
         <p:spPr>
           <a:xfrm>
             <a:off x="5791200" y="1573338"/>
-            <a:ext cx="2546850" cy="3319800"/>
+            <a:ext cx="2870176" cy="3319800"/>
           </a:xfrm>
           <a:prstGeom prst="rect">
             <a:avLst/>
@@ -18960,7 +19787,11 @@
                                           </p:stCondLst>
                                         </p:cTn>
                                         <p:tgtEl>
-                                          <p:spTgt spid="7"/>
+                                          <p:spTgt spid="5">
+                                            <p:txEl>
+                                              <p:pRg st="0" end="0"/>
+                                            </p:txEl>
+                                          </p:spTgt>
                                         </p:tgtEl>
                                         <p:attrNameLst>
                                           <p:attrName>style.visibility</p:attrName>
@@ -19005,7 +19836,11 @@
                                           </p:stCondLst>
                                         </p:cTn>
                                         <p:tgtEl>
-                                          <p:spTgt spid="8"/>
+                                          <p:spTgt spid="5">
+                                            <p:txEl>
+                                              <p:pRg st="1" end="1"/>
+                                            </p:txEl>
+                                          </p:spTgt>
                                         </p:tgtEl>
                                         <p:attrNameLst>
                                           <p:attrName>style.visibility</p:attrName>
@@ -19050,7 +19885,11 @@
                                           </p:stCondLst>
                                         </p:cTn>
                                         <p:tgtEl>
-                                          <p:spTgt spid="9"/>
+                                          <p:spTgt spid="5">
+                                            <p:txEl>
+                                              <p:pRg st="2" end="2"/>
+                                            </p:txEl>
+                                          </p:spTgt>
                                         </p:tgtEl>
                                         <p:attrNameLst>
                                           <p:attrName>style.visibility</p:attrName>
@@ -19095,7 +19934,11 @@
                                           </p:stCondLst>
                                         </p:cTn>
                                         <p:tgtEl>
-                                          <p:spTgt spid="10"/>
+                                          <p:spTgt spid="5">
+                                            <p:txEl>
+                                              <p:pRg st="3" end="3"/>
+                                            </p:txEl>
+                                          </p:spTgt>
                                         </p:tgtEl>
                                         <p:attrNameLst>
                                           <p:attrName>style.visibility</p:attrName>
@@ -19140,7 +19983,11 @@
                                           </p:stCondLst>
                                         </p:cTn>
                                         <p:tgtEl>
-                                          <p:spTgt spid="11"/>
+                                          <p:spTgt spid="5">
+                                            <p:txEl>
+                                              <p:pRg st="4" end="4"/>
+                                            </p:txEl>
+                                          </p:spTgt>
                                         </p:tgtEl>
                                         <p:attrNameLst>
                                           <p:attrName>style.visibility</p:attrName>
@@ -19185,7 +20032,11 @@
                                           </p:stCondLst>
                                         </p:cTn>
                                         <p:tgtEl>
-                                          <p:spTgt spid="12"/>
+                                          <p:spTgt spid="5">
+                                            <p:txEl>
+                                              <p:pRg st="5" end="5"/>
+                                            </p:txEl>
+                                          </p:spTgt>
                                         </p:tgtEl>
                                         <p:attrNameLst>
                                           <p:attrName>style.visibility</p:attrName>
@@ -19230,7 +20081,7 @@
                                           </p:stCondLst>
                                         </p:cTn>
                                         <p:tgtEl>
-                                          <p:spTgt spid="13"/>
+                                          <p:spTgt spid="7"/>
                                         </p:tgtEl>
                                         <p:attrNameLst>
                                           <p:attrName>style.visibility</p:attrName>
@@ -19262,7 +20113,7 @@
                             </p:stCondLst>
                             <p:childTnLst>
                               <p:par>
-                                <p:cTn id="33" presetID="1" presetClass="entr" presetSubtype="0" fill="hold" nodeType="clickEffect">
+                                <p:cTn id="33" presetID="1" presetClass="entr" presetSubtype="0" fill="hold" grpId="0" nodeType="clickEffect">
                                   <p:stCondLst>
                                     <p:cond delay="0"/>
                                   </p:stCondLst>
@@ -19275,7 +20126,7 @@
                                           </p:stCondLst>
                                         </p:cTn>
                                         <p:tgtEl>
-                                          <p:spTgt spid="14"/>
+                                          <p:spTgt spid="8"/>
                                         </p:tgtEl>
                                         <p:attrNameLst>
                                           <p:attrName>style.visibility</p:attrName>
@@ -19307,7 +20158,7 @@
                             </p:stCondLst>
                             <p:childTnLst>
                               <p:par>
-                                <p:cTn id="37" presetID="1" presetClass="entr" presetSubtype="0" fill="hold" nodeType="clickEffect">
+                                <p:cTn id="37" presetID="1" presetClass="entr" presetSubtype="0" fill="hold" grpId="0" nodeType="clickEffect">
                                   <p:stCondLst>
                                     <p:cond delay="0"/>
                                   </p:stCondLst>
@@ -19315,6 +20166,276 @@
                                     <p:set>
                                       <p:cBhvr>
                                         <p:cTn id="38" dur="1" fill="hold">
+                                          <p:stCondLst>
+                                            <p:cond delay="0"/>
+                                          </p:stCondLst>
+                                        </p:cTn>
+                                        <p:tgtEl>
+                                          <p:spTgt spid="9"/>
+                                        </p:tgtEl>
+                                        <p:attrNameLst>
+                                          <p:attrName>style.visibility</p:attrName>
+                                        </p:attrNameLst>
+                                      </p:cBhvr>
+                                      <p:to>
+                                        <p:strVal val="visible"/>
+                                      </p:to>
+                                    </p:set>
+                                  </p:childTnLst>
+                                </p:cTn>
+                              </p:par>
+                            </p:childTnLst>
+                          </p:cTn>
+                        </p:par>
+                      </p:childTnLst>
+                    </p:cTn>
+                  </p:par>
+                  <p:par>
+                    <p:cTn id="39" fill="hold">
+                      <p:stCondLst>
+                        <p:cond delay="indefinite"/>
+                      </p:stCondLst>
+                      <p:childTnLst>
+                        <p:par>
+                          <p:cTn id="40" fill="hold">
+                            <p:stCondLst>
+                              <p:cond delay="0"/>
+                            </p:stCondLst>
+                            <p:childTnLst>
+                              <p:par>
+                                <p:cTn id="41" presetID="1" presetClass="entr" presetSubtype="0" fill="hold" grpId="0" nodeType="clickEffect">
+                                  <p:stCondLst>
+                                    <p:cond delay="0"/>
+                                  </p:stCondLst>
+                                  <p:childTnLst>
+                                    <p:set>
+                                      <p:cBhvr>
+                                        <p:cTn id="42" dur="1" fill="hold">
+                                          <p:stCondLst>
+                                            <p:cond delay="0"/>
+                                          </p:stCondLst>
+                                        </p:cTn>
+                                        <p:tgtEl>
+                                          <p:spTgt spid="10"/>
+                                        </p:tgtEl>
+                                        <p:attrNameLst>
+                                          <p:attrName>style.visibility</p:attrName>
+                                        </p:attrNameLst>
+                                      </p:cBhvr>
+                                      <p:to>
+                                        <p:strVal val="visible"/>
+                                      </p:to>
+                                    </p:set>
+                                  </p:childTnLst>
+                                </p:cTn>
+                              </p:par>
+                            </p:childTnLst>
+                          </p:cTn>
+                        </p:par>
+                      </p:childTnLst>
+                    </p:cTn>
+                  </p:par>
+                  <p:par>
+                    <p:cTn id="43" fill="hold">
+                      <p:stCondLst>
+                        <p:cond delay="indefinite"/>
+                      </p:stCondLst>
+                      <p:childTnLst>
+                        <p:par>
+                          <p:cTn id="44" fill="hold">
+                            <p:stCondLst>
+                              <p:cond delay="0"/>
+                            </p:stCondLst>
+                            <p:childTnLst>
+                              <p:par>
+                                <p:cTn id="45" presetID="1" presetClass="entr" presetSubtype="0" fill="hold" grpId="0" nodeType="clickEffect">
+                                  <p:stCondLst>
+                                    <p:cond delay="0"/>
+                                  </p:stCondLst>
+                                  <p:childTnLst>
+                                    <p:set>
+                                      <p:cBhvr>
+                                        <p:cTn id="46" dur="1" fill="hold">
+                                          <p:stCondLst>
+                                            <p:cond delay="0"/>
+                                          </p:stCondLst>
+                                        </p:cTn>
+                                        <p:tgtEl>
+                                          <p:spTgt spid="11"/>
+                                        </p:tgtEl>
+                                        <p:attrNameLst>
+                                          <p:attrName>style.visibility</p:attrName>
+                                        </p:attrNameLst>
+                                      </p:cBhvr>
+                                      <p:to>
+                                        <p:strVal val="visible"/>
+                                      </p:to>
+                                    </p:set>
+                                  </p:childTnLst>
+                                </p:cTn>
+                              </p:par>
+                            </p:childTnLst>
+                          </p:cTn>
+                        </p:par>
+                      </p:childTnLst>
+                    </p:cTn>
+                  </p:par>
+                  <p:par>
+                    <p:cTn id="47" fill="hold">
+                      <p:stCondLst>
+                        <p:cond delay="indefinite"/>
+                      </p:stCondLst>
+                      <p:childTnLst>
+                        <p:par>
+                          <p:cTn id="48" fill="hold">
+                            <p:stCondLst>
+                              <p:cond delay="0"/>
+                            </p:stCondLst>
+                            <p:childTnLst>
+                              <p:par>
+                                <p:cTn id="49" presetID="1" presetClass="entr" presetSubtype="0" fill="hold" grpId="0" nodeType="clickEffect">
+                                  <p:stCondLst>
+                                    <p:cond delay="0"/>
+                                  </p:stCondLst>
+                                  <p:childTnLst>
+                                    <p:set>
+                                      <p:cBhvr>
+                                        <p:cTn id="50" dur="1" fill="hold">
+                                          <p:stCondLst>
+                                            <p:cond delay="0"/>
+                                          </p:stCondLst>
+                                        </p:cTn>
+                                        <p:tgtEl>
+                                          <p:spTgt spid="12"/>
+                                        </p:tgtEl>
+                                        <p:attrNameLst>
+                                          <p:attrName>style.visibility</p:attrName>
+                                        </p:attrNameLst>
+                                      </p:cBhvr>
+                                      <p:to>
+                                        <p:strVal val="visible"/>
+                                      </p:to>
+                                    </p:set>
+                                  </p:childTnLst>
+                                </p:cTn>
+                              </p:par>
+                            </p:childTnLst>
+                          </p:cTn>
+                        </p:par>
+                      </p:childTnLst>
+                    </p:cTn>
+                  </p:par>
+                  <p:par>
+                    <p:cTn id="51" fill="hold">
+                      <p:stCondLst>
+                        <p:cond delay="indefinite"/>
+                      </p:stCondLst>
+                      <p:childTnLst>
+                        <p:par>
+                          <p:cTn id="52" fill="hold">
+                            <p:stCondLst>
+                              <p:cond delay="0"/>
+                            </p:stCondLst>
+                            <p:childTnLst>
+                              <p:par>
+                                <p:cTn id="53" presetID="1" presetClass="entr" presetSubtype="0" fill="hold" grpId="0" nodeType="clickEffect">
+                                  <p:stCondLst>
+                                    <p:cond delay="0"/>
+                                  </p:stCondLst>
+                                  <p:childTnLst>
+                                    <p:set>
+                                      <p:cBhvr>
+                                        <p:cTn id="54" dur="1" fill="hold">
+                                          <p:stCondLst>
+                                            <p:cond delay="0"/>
+                                          </p:stCondLst>
+                                        </p:cTn>
+                                        <p:tgtEl>
+                                          <p:spTgt spid="13"/>
+                                        </p:tgtEl>
+                                        <p:attrNameLst>
+                                          <p:attrName>style.visibility</p:attrName>
+                                        </p:attrNameLst>
+                                      </p:cBhvr>
+                                      <p:to>
+                                        <p:strVal val="visible"/>
+                                      </p:to>
+                                    </p:set>
+                                  </p:childTnLst>
+                                </p:cTn>
+                              </p:par>
+                            </p:childTnLst>
+                          </p:cTn>
+                        </p:par>
+                      </p:childTnLst>
+                    </p:cTn>
+                  </p:par>
+                  <p:par>
+                    <p:cTn id="55" fill="hold">
+                      <p:stCondLst>
+                        <p:cond delay="indefinite"/>
+                      </p:stCondLst>
+                      <p:childTnLst>
+                        <p:par>
+                          <p:cTn id="56" fill="hold">
+                            <p:stCondLst>
+                              <p:cond delay="0"/>
+                            </p:stCondLst>
+                            <p:childTnLst>
+                              <p:par>
+                                <p:cTn id="57" presetID="1" presetClass="entr" presetSubtype="0" fill="hold" nodeType="clickEffect">
+                                  <p:stCondLst>
+                                    <p:cond delay="0"/>
+                                  </p:stCondLst>
+                                  <p:childTnLst>
+                                    <p:set>
+                                      <p:cBhvr>
+                                        <p:cTn id="58" dur="1" fill="hold">
+                                          <p:stCondLst>
+                                            <p:cond delay="0"/>
+                                          </p:stCondLst>
+                                        </p:cTn>
+                                        <p:tgtEl>
+                                          <p:spTgt spid="14"/>
+                                        </p:tgtEl>
+                                        <p:attrNameLst>
+                                          <p:attrName>style.visibility</p:attrName>
+                                        </p:attrNameLst>
+                                      </p:cBhvr>
+                                      <p:to>
+                                        <p:strVal val="visible"/>
+                                      </p:to>
+                                    </p:set>
+                                  </p:childTnLst>
+                                </p:cTn>
+                              </p:par>
+                            </p:childTnLst>
+                          </p:cTn>
+                        </p:par>
+                      </p:childTnLst>
+                    </p:cTn>
+                  </p:par>
+                  <p:par>
+                    <p:cTn id="59" fill="hold">
+                      <p:stCondLst>
+                        <p:cond delay="indefinite"/>
+                      </p:stCondLst>
+                      <p:childTnLst>
+                        <p:par>
+                          <p:cTn id="60" fill="hold">
+                            <p:stCondLst>
+                              <p:cond delay="0"/>
+                            </p:stCondLst>
+                            <p:childTnLst>
+                              <p:par>
+                                <p:cTn id="61" presetID="1" presetClass="entr" presetSubtype="0" fill="hold" nodeType="clickEffect">
+                                  <p:stCondLst>
+                                    <p:cond delay="0"/>
+                                  </p:stCondLst>
+                                  <p:childTnLst>
+                                    <p:set>
+                                      <p:cBhvr>
+                                        <p:cTn id="62" dur="1" fill="hold">
                                           <p:stCondLst>
                                             <p:cond delay="0"/>
                                           </p:stCondLst>
@@ -19361,6 +20482,7 @@
       </p:par>
     </p:tnLst>
     <p:bldLst>
+      <p:bldP spid="5" grpId="0" uiExpand="1" build="p"/>
       <p:bldP spid="7" grpId="0"/>
       <p:bldP spid="8" grpId="0"/>
       <p:bldP spid="9" grpId="0"/>
@@ -21542,6 +22664,359 @@
   <p:clrMapOvr>
     <a:masterClrMapping/>
   </p:clrMapOvr>
+  <p:timing>
+    <p:tnLst>
+      <p:par>
+        <p:cTn id="1" dur="indefinite" restart="never" nodeType="tmRoot">
+          <p:childTnLst>
+            <p:seq concurrent="1" nextAc="seek">
+              <p:cTn id="2" dur="indefinite" nodeType="mainSeq">
+                <p:childTnLst>
+                  <p:par>
+                    <p:cTn id="3" fill="hold">
+                      <p:stCondLst>
+                        <p:cond delay="indefinite"/>
+                      </p:stCondLst>
+                      <p:childTnLst>
+                        <p:par>
+                          <p:cTn id="4" fill="hold">
+                            <p:stCondLst>
+                              <p:cond delay="0"/>
+                            </p:stCondLst>
+                            <p:childTnLst>
+                              <p:par>
+                                <p:cTn id="5" presetID="1" presetClass="entr" presetSubtype="0" fill="hold" grpId="0" nodeType="clickEffect">
+                                  <p:stCondLst>
+                                    <p:cond delay="0"/>
+                                  </p:stCondLst>
+                                  <p:childTnLst>
+                                    <p:set>
+                                      <p:cBhvr>
+                                        <p:cTn id="6" dur="1" fill="hold">
+                                          <p:stCondLst>
+                                            <p:cond delay="0"/>
+                                          </p:stCondLst>
+                                        </p:cTn>
+                                        <p:tgtEl>
+                                          <p:spTgt spid="5">
+                                            <p:txEl>
+                                              <p:pRg st="0" end="0"/>
+                                            </p:txEl>
+                                          </p:spTgt>
+                                        </p:tgtEl>
+                                        <p:attrNameLst>
+                                          <p:attrName>style.visibility</p:attrName>
+                                        </p:attrNameLst>
+                                      </p:cBhvr>
+                                      <p:to>
+                                        <p:strVal val="visible"/>
+                                      </p:to>
+                                    </p:set>
+                                  </p:childTnLst>
+                                </p:cTn>
+                              </p:par>
+                            </p:childTnLst>
+                          </p:cTn>
+                        </p:par>
+                      </p:childTnLst>
+                    </p:cTn>
+                  </p:par>
+                  <p:par>
+                    <p:cTn id="7" fill="hold">
+                      <p:stCondLst>
+                        <p:cond delay="indefinite"/>
+                      </p:stCondLst>
+                      <p:childTnLst>
+                        <p:par>
+                          <p:cTn id="8" fill="hold">
+                            <p:stCondLst>
+                              <p:cond delay="0"/>
+                            </p:stCondLst>
+                            <p:childTnLst>
+                              <p:par>
+                                <p:cTn id="9" presetID="1" presetClass="entr" presetSubtype="0" fill="hold" grpId="0" nodeType="clickEffect">
+                                  <p:stCondLst>
+                                    <p:cond delay="0"/>
+                                  </p:stCondLst>
+                                  <p:childTnLst>
+                                    <p:set>
+                                      <p:cBhvr>
+                                        <p:cTn id="10" dur="1" fill="hold">
+                                          <p:stCondLst>
+                                            <p:cond delay="0"/>
+                                          </p:stCondLst>
+                                        </p:cTn>
+                                        <p:tgtEl>
+                                          <p:spTgt spid="5">
+                                            <p:txEl>
+                                              <p:pRg st="1" end="1"/>
+                                            </p:txEl>
+                                          </p:spTgt>
+                                        </p:tgtEl>
+                                        <p:attrNameLst>
+                                          <p:attrName>style.visibility</p:attrName>
+                                        </p:attrNameLst>
+                                      </p:cBhvr>
+                                      <p:to>
+                                        <p:strVal val="visible"/>
+                                      </p:to>
+                                    </p:set>
+                                  </p:childTnLst>
+                                </p:cTn>
+                              </p:par>
+                              <p:par>
+                                <p:cTn id="11" presetID="1" presetClass="entr" presetSubtype="0" fill="hold" grpId="0" nodeType="withEffect">
+                                  <p:stCondLst>
+                                    <p:cond delay="0"/>
+                                  </p:stCondLst>
+                                  <p:childTnLst>
+                                    <p:set>
+                                      <p:cBhvr>
+                                        <p:cTn id="12" dur="1" fill="hold">
+                                          <p:stCondLst>
+                                            <p:cond delay="0"/>
+                                          </p:stCondLst>
+                                        </p:cTn>
+                                        <p:tgtEl>
+                                          <p:spTgt spid="5">
+                                            <p:txEl>
+                                              <p:pRg st="2" end="2"/>
+                                            </p:txEl>
+                                          </p:spTgt>
+                                        </p:tgtEl>
+                                        <p:attrNameLst>
+                                          <p:attrName>style.visibility</p:attrName>
+                                        </p:attrNameLst>
+                                      </p:cBhvr>
+                                      <p:to>
+                                        <p:strVal val="visible"/>
+                                      </p:to>
+                                    </p:set>
+                                  </p:childTnLst>
+                                </p:cTn>
+                              </p:par>
+                            </p:childTnLst>
+                          </p:cTn>
+                        </p:par>
+                      </p:childTnLst>
+                    </p:cTn>
+                  </p:par>
+                  <p:par>
+                    <p:cTn id="13" fill="hold">
+                      <p:stCondLst>
+                        <p:cond delay="indefinite"/>
+                      </p:stCondLst>
+                      <p:childTnLst>
+                        <p:par>
+                          <p:cTn id="14" fill="hold">
+                            <p:stCondLst>
+                              <p:cond delay="0"/>
+                            </p:stCondLst>
+                            <p:childTnLst>
+                              <p:par>
+                                <p:cTn id="15" presetID="1" presetClass="entr" presetSubtype="0" fill="hold" grpId="0" nodeType="clickEffect">
+                                  <p:stCondLst>
+                                    <p:cond delay="0"/>
+                                  </p:stCondLst>
+                                  <p:childTnLst>
+                                    <p:set>
+                                      <p:cBhvr>
+                                        <p:cTn id="16" dur="1" fill="hold">
+                                          <p:stCondLst>
+                                            <p:cond delay="0"/>
+                                          </p:stCondLst>
+                                        </p:cTn>
+                                        <p:tgtEl>
+                                          <p:spTgt spid="5">
+                                            <p:txEl>
+                                              <p:pRg st="3" end="3"/>
+                                            </p:txEl>
+                                          </p:spTgt>
+                                        </p:tgtEl>
+                                        <p:attrNameLst>
+                                          <p:attrName>style.visibility</p:attrName>
+                                        </p:attrNameLst>
+                                      </p:cBhvr>
+                                      <p:to>
+                                        <p:strVal val="visible"/>
+                                      </p:to>
+                                    </p:set>
+                                  </p:childTnLst>
+                                </p:cTn>
+                              </p:par>
+                            </p:childTnLst>
+                          </p:cTn>
+                        </p:par>
+                      </p:childTnLst>
+                    </p:cTn>
+                  </p:par>
+                  <p:par>
+                    <p:cTn id="17" fill="hold">
+                      <p:stCondLst>
+                        <p:cond delay="indefinite"/>
+                      </p:stCondLst>
+                      <p:childTnLst>
+                        <p:par>
+                          <p:cTn id="18" fill="hold">
+                            <p:stCondLst>
+                              <p:cond delay="0"/>
+                            </p:stCondLst>
+                            <p:childTnLst>
+                              <p:par>
+                                <p:cTn id="19" presetID="1" presetClass="entr" presetSubtype="0" fill="hold" grpId="0" nodeType="clickEffect">
+                                  <p:stCondLst>
+                                    <p:cond delay="0"/>
+                                  </p:stCondLst>
+                                  <p:childTnLst>
+                                    <p:set>
+                                      <p:cBhvr>
+                                        <p:cTn id="20" dur="1" fill="hold">
+                                          <p:stCondLst>
+                                            <p:cond delay="0"/>
+                                          </p:stCondLst>
+                                        </p:cTn>
+                                        <p:tgtEl>
+                                          <p:spTgt spid="5">
+                                            <p:txEl>
+                                              <p:pRg st="4" end="4"/>
+                                            </p:txEl>
+                                          </p:spTgt>
+                                        </p:tgtEl>
+                                        <p:attrNameLst>
+                                          <p:attrName>style.visibility</p:attrName>
+                                        </p:attrNameLst>
+                                      </p:cBhvr>
+                                      <p:to>
+                                        <p:strVal val="visible"/>
+                                      </p:to>
+                                    </p:set>
+                                  </p:childTnLst>
+                                </p:cTn>
+                              </p:par>
+                              <p:par>
+                                <p:cTn id="21" presetID="1" presetClass="entr" presetSubtype="0" fill="hold" grpId="0" nodeType="withEffect">
+                                  <p:stCondLst>
+                                    <p:cond delay="0"/>
+                                  </p:stCondLst>
+                                  <p:childTnLst>
+                                    <p:set>
+                                      <p:cBhvr>
+                                        <p:cTn id="22" dur="1" fill="hold">
+                                          <p:stCondLst>
+                                            <p:cond delay="0"/>
+                                          </p:stCondLst>
+                                        </p:cTn>
+                                        <p:tgtEl>
+                                          <p:spTgt spid="5">
+                                            <p:txEl>
+                                              <p:pRg st="5" end="5"/>
+                                            </p:txEl>
+                                          </p:spTgt>
+                                        </p:tgtEl>
+                                        <p:attrNameLst>
+                                          <p:attrName>style.visibility</p:attrName>
+                                        </p:attrNameLst>
+                                      </p:cBhvr>
+                                      <p:to>
+                                        <p:strVal val="visible"/>
+                                      </p:to>
+                                    </p:set>
+                                  </p:childTnLst>
+                                </p:cTn>
+                              </p:par>
+                              <p:par>
+                                <p:cTn id="23" presetID="1" presetClass="entr" presetSubtype="0" fill="hold" grpId="0" nodeType="withEffect">
+                                  <p:stCondLst>
+                                    <p:cond delay="0"/>
+                                  </p:stCondLst>
+                                  <p:childTnLst>
+                                    <p:set>
+                                      <p:cBhvr>
+                                        <p:cTn id="24" dur="1" fill="hold">
+                                          <p:stCondLst>
+                                            <p:cond delay="0"/>
+                                          </p:stCondLst>
+                                        </p:cTn>
+                                        <p:tgtEl>
+                                          <p:spTgt spid="5">
+                                            <p:txEl>
+                                              <p:pRg st="6" end="6"/>
+                                            </p:txEl>
+                                          </p:spTgt>
+                                        </p:tgtEl>
+                                        <p:attrNameLst>
+                                          <p:attrName>style.visibility</p:attrName>
+                                        </p:attrNameLst>
+                                      </p:cBhvr>
+                                      <p:to>
+                                        <p:strVal val="visible"/>
+                                      </p:to>
+                                    </p:set>
+                                  </p:childTnLst>
+                                </p:cTn>
+                              </p:par>
+                              <p:par>
+                                <p:cTn id="25" presetID="1" presetClass="entr" presetSubtype="0" fill="hold" grpId="0" nodeType="withEffect">
+                                  <p:stCondLst>
+                                    <p:cond delay="0"/>
+                                  </p:stCondLst>
+                                  <p:childTnLst>
+                                    <p:set>
+                                      <p:cBhvr>
+                                        <p:cTn id="26" dur="1" fill="hold">
+                                          <p:stCondLst>
+                                            <p:cond delay="0"/>
+                                          </p:stCondLst>
+                                        </p:cTn>
+                                        <p:tgtEl>
+                                          <p:spTgt spid="5">
+                                            <p:txEl>
+                                              <p:pRg st="7" end="7"/>
+                                            </p:txEl>
+                                          </p:spTgt>
+                                        </p:tgtEl>
+                                        <p:attrNameLst>
+                                          <p:attrName>style.visibility</p:attrName>
+                                        </p:attrNameLst>
+                                      </p:cBhvr>
+                                      <p:to>
+                                        <p:strVal val="visible"/>
+                                      </p:to>
+                                    </p:set>
+                                  </p:childTnLst>
+                                </p:cTn>
+                              </p:par>
+                            </p:childTnLst>
+                          </p:cTn>
+                        </p:par>
+                      </p:childTnLst>
+                    </p:cTn>
+                  </p:par>
+                </p:childTnLst>
+              </p:cTn>
+              <p:prevCondLst>
+                <p:cond evt="onPrev" delay="0">
+                  <p:tgtEl>
+                    <p:sldTgt/>
+                  </p:tgtEl>
+                </p:cond>
+              </p:prevCondLst>
+              <p:nextCondLst>
+                <p:cond evt="onNext" delay="0">
+                  <p:tgtEl>
+                    <p:sldTgt/>
+                  </p:tgtEl>
+                </p:cond>
+              </p:nextCondLst>
+            </p:seq>
+          </p:childTnLst>
+        </p:cTn>
+      </p:par>
+    </p:tnLst>
+    <p:bldLst>
+      <p:bldP spid="5" grpId="0" build="p"/>
+    </p:bldLst>
+  </p:timing>
 </p:sld>
 </file>
 
@@ -22442,6 +23917,480 @@
   <p:clrMapOvr>
     <a:masterClrMapping/>
   </p:clrMapOvr>
+  <p:timing>
+    <p:tnLst>
+      <p:par>
+        <p:cTn id="1" dur="indefinite" restart="never" nodeType="tmRoot">
+          <p:childTnLst>
+            <p:seq concurrent="1" nextAc="seek">
+              <p:cTn id="2" dur="indefinite" nodeType="mainSeq">
+                <p:childTnLst>
+                  <p:par>
+                    <p:cTn id="3" fill="hold">
+                      <p:stCondLst>
+                        <p:cond delay="indefinite"/>
+                      </p:stCondLst>
+                      <p:childTnLst>
+                        <p:par>
+                          <p:cTn id="4" fill="hold">
+                            <p:stCondLst>
+                              <p:cond delay="0"/>
+                            </p:stCondLst>
+                            <p:childTnLst>
+                              <p:par>
+                                <p:cTn id="5" presetID="1" presetClass="entr" presetSubtype="0" fill="hold" grpId="0" nodeType="clickEffect">
+                                  <p:stCondLst>
+                                    <p:cond delay="0"/>
+                                  </p:stCondLst>
+                                  <p:childTnLst>
+                                    <p:set>
+                                      <p:cBhvr>
+                                        <p:cTn id="6" dur="1" fill="hold">
+                                          <p:stCondLst>
+                                            <p:cond delay="0"/>
+                                          </p:stCondLst>
+                                        </p:cTn>
+                                        <p:tgtEl>
+                                          <p:spTgt spid="5">
+                                            <p:txEl>
+                                              <p:pRg st="0" end="0"/>
+                                            </p:txEl>
+                                          </p:spTgt>
+                                        </p:tgtEl>
+                                        <p:attrNameLst>
+                                          <p:attrName>style.visibility</p:attrName>
+                                        </p:attrNameLst>
+                                      </p:cBhvr>
+                                      <p:to>
+                                        <p:strVal val="visible"/>
+                                      </p:to>
+                                    </p:set>
+                                  </p:childTnLst>
+                                </p:cTn>
+                              </p:par>
+                            </p:childTnLst>
+                          </p:cTn>
+                        </p:par>
+                      </p:childTnLst>
+                    </p:cTn>
+                  </p:par>
+                  <p:par>
+                    <p:cTn id="7" fill="hold">
+                      <p:stCondLst>
+                        <p:cond delay="indefinite"/>
+                      </p:stCondLst>
+                      <p:childTnLst>
+                        <p:par>
+                          <p:cTn id="8" fill="hold">
+                            <p:stCondLst>
+                              <p:cond delay="0"/>
+                            </p:stCondLst>
+                            <p:childTnLst>
+                              <p:par>
+                                <p:cTn id="9" presetID="1" presetClass="entr" presetSubtype="0" fill="hold" grpId="0" nodeType="clickEffect">
+                                  <p:stCondLst>
+                                    <p:cond delay="0"/>
+                                  </p:stCondLst>
+                                  <p:childTnLst>
+                                    <p:set>
+                                      <p:cBhvr>
+                                        <p:cTn id="10" dur="1" fill="hold">
+                                          <p:stCondLst>
+                                            <p:cond delay="0"/>
+                                          </p:stCondLst>
+                                        </p:cTn>
+                                        <p:tgtEl>
+                                          <p:spTgt spid="5">
+                                            <p:txEl>
+                                              <p:pRg st="1" end="1"/>
+                                            </p:txEl>
+                                          </p:spTgt>
+                                        </p:tgtEl>
+                                        <p:attrNameLst>
+                                          <p:attrName>style.visibility</p:attrName>
+                                        </p:attrNameLst>
+                                      </p:cBhvr>
+                                      <p:to>
+                                        <p:strVal val="visible"/>
+                                      </p:to>
+                                    </p:set>
+                                  </p:childTnLst>
+                                </p:cTn>
+                              </p:par>
+                            </p:childTnLst>
+                          </p:cTn>
+                        </p:par>
+                      </p:childTnLst>
+                    </p:cTn>
+                  </p:par>
+                  <p:par>
+                    <p:cTn id="11" fill="hold">
+                      <p:stCondLst>
+                        <p:cond delay="indefinite"/>
+                      </p:stCondLst>
+                      <p:childTnLst>
+                        <p:par>
+                          <p:cTn id="12" fill="hold">
+                            <p:stCondLst>
+                              <p:cond delay="0"/>
+                            </p:stCondLst>
+                            <p:childTnLst>
+                              <p:par>
+                                <p:cTn id="13" presetID="1" presetClass="entr" presetSubtype="0" fill="hold" grpId="0" nodeType="clickEffect">
+                                  <p:stCondLst>
+                                    <p:cond delay="0"/>
+                                  </p:stCondLst>
+                                  <p:childTnLst>
+                                    <p:set>
+                                      <p:cBhvr>
+                                        <p:cTn id="14" dur="1" fill="hold">
+                                          <p:stCondLst>
+                                            <p:cond delay="0"/>
+                                          </p:stCondLst>
+                                        </p:cTn>
+                                        <p:tgtEl>
+                                          <p:spTgt spid="5">
+                                            <p:txEl>
+                                              <p:pRg st="2" end="2"/>
+                                            </p:txEl>
+                                          </p:spTgt>
+                                        </p:tgtEl>
+                                        <p:attrNameLst>
+                                          <p:attrName>style.visibility</p:attrName>
+                                        </p:attrNameLst>
+                                      </p:cBhvr>
+                                      <p:to>
+                                        <p:strVal val="visible"/>
+                                      </p:to>
+                                    </p:set>
+                                  </p:childTnLst>
+                                </p:cTn>
+                              </p:par>
+                            </p:childTnLst>
+                          </p:cTn>
+                        </p:par>
+                      </p:childTnLst>
+                    </p:cTn>
+                  </p:par>
+                  <p:par>
+                    <p:cTn id="15" fill="hold">
+                      <p:stCondLst>
+                        <p:cond delay="indefinite"/>
+                      </p:stCondLst>
+                      <p:childTnLst>
+                        <p:par>
+                          <p:cTn id="16" fill="hold">
+                            <p:stCondLst>
+                              <p:cond delay="0"/>
+                            </p:stCondLst>
+                            <p:childTnLst>
+                              <p:par>
+                                <p:cTn id="17" presetID="1" presetClass="entr" presetSubtype="0" fill="hold" grpId="0" nodeType="clickEffect">
+                                  <p:stCondLst>
+                                    <p:cond delay="0"/>
+                                  </p:stCondLst>
+                                  <p:childTnLst>
+                                    <p:set>
+                                      <p:cBhvr>
+                                        <p:cTn id="18" dur="1" fill="hold">
+                                          <p:stCondLst>
+                                            <p:cond delay="0"/>
+                                          </p:stCondLst>
+                                        </p:cTn>
+                                        <p:tgtEl>
+                                          <p:spTgt spid="5">
+                                            <p:txEl>
+                                              <p:pRg st="3" end="3"/>
+                                            </p:txEl>
+                                          </p:spTgt>
+                                        </p:tgtEl>
+                                        <p:attrNameLst>
+                                          <p:attrName>style.visibility</p:attrName>
+                                        </p:attrNameLst>
+                                      </p:cBhvr>
+                                      <p:to>
+                                        <p:strVal val="visible"/>
+                                      </p:to>
+                                    </p:set>
+                                  </p:childTnLst>
+                                </p:cTn>
+                              </p:par>
+                            </p:childTnLst>
+                          </p:cTn>
+                        </p:par>
+                      </p:childTnLst>
+                    </p:cTn>
+                  </p:par>
+                  <p:par>
+                    <p:cTn id="19" fill="hold">
+                      <p:stCondLst>
+                        <p:cond delay="indefinite"/>
+                      </p:stCondLst>
+                      <p:childTnLst>
+                        <p:par>
+                          <p:cTn id="20" fill="hold">
+                            <p:stCondLst>
+                              <p:cond delay="0"/>
+                            </p:stCondLst>
+                            <p:childTnLst>
+                              <p:par>
+                                <p:cTn id="21" presetID="1" presetClass="entr" presetSubtype="0" fill="hold" grpId="0" nodeType="clickEffect">
+                                  <p:stCondLst>
+                                    <p:cond delay="0"/>
+                                  </p:stCondLst>
+                                  <p:childTnLst>
+                                    <p:set>
+                                      <p:cBhvr>
+                                        <p:cTn id="22" dur="1" fill="hold">
+                                          <p:stCondLst>
+                                            <p:cond delay="0"/>
+                                          </p:stCondLst>
+                                        </p:cTn>
+                                        <p:tgtEl>
+                                          <p:spTgt spid="5">
+                                            <p:txEl>
+                                              <p:pRg st="4" end="4"/>
+                                            </p:txEl>
+                                          </p:spTgt>
+                                        </p:tgtEl>
+                                        <p:attrNameLst>
+                                          <p:attrName>style.visibility</p:attrName>
+                                        </p:attrNameLst>
+                                      </p:cBhvr>
+                                      <p:to>
+                                        <p:strVal val="visible"/>
+                                      </p:to>
+                                    </p:set>
+                                  </p:childTnLst>
+                                </p:cTn>
+                              </p:par>
+                            </p:childTnLst>
+                          </p:cTn>
+                        </p:par>
+                      </p:childTnLst>
+                    </p:cTn>
+                  </p:par>
+                  <p:par>
+                    <p:cTn id="23" fill="hold">
+                      <p:stCondLst>
+                        <p:cond delay="indefinite"/>
+                      </p:stCondLst>
+                      <p:childTnLst>
+                        <p:par>
+                          <p:cTn id="24" fill="hold">
+                            <p:stCondLst>
+                              <p:cond delay="0"/>
+                            </p:stCondLst>
+                            <p:childTnLst>
+                              <p:par>
+                                <p:cTn id="25" presetID="1" presetClass="entr" presetSubtype="0" fill="hold" grpId="0" nodeType="clickEffect">
+                                  <p:stCondLst>
+                                    <p:cond delay="0"/>
+                                  </p:stCondLst>
+                                  <p:childTnLst>
+                                    <p:set>
+                                      <p:cBhvr>
+                                        <p:cTn id="26" dur="1" fill="hold">
+                                          <p:stCondLst>
+                                            <p:cond delay="0"/>
+                                          </p:stCondLst>
+                                        </p:cTn>
+                                        <p:tgtEl>
+                                          <p:spTgt spid="5">
+                                            <p:txEl>
+                                              <p:pRg st="5" end="5"/>
+                                            </p:txEl>
+                                          </p:spTgt>
+                                        </p:tgtEl>
+                                        <p:attrNameLst>
+                                          <p:attrName>style.visibility</p:attrName>
+                                        </p:attrNameLst>
+                                      </p:cBhvr>
+                                      <p:to>
+                                        <p:strVal val="visible"/>
+                                      </p:to>
+                                    </p:set>
+                                  </p:childTnLst>
+                                </p:cTn>
+                              </p:par>
+                            </p:childTnLst>
+                          </p:cTn>
+                        </p:par>
+                      </p:childTnLst>
+                    </p:cTn>
+                  </p:par>
+                  <p:par>
+                    <p:cTn id="27" fill="hold">
+                      <p:stCondLst>
+                        <p:cond delay="indefinite"/>
+                      </p:stCondLst>
+                      <p:childTnLst>
+                        <p:par>
+                          <p:cTn id="28" fill="hold">
+                            <p:stCondLst>
+                              <p:cond delay="0"/>
+                            </p:stCondLst>
+                            <p:childTnLst>
+                              <p:par>
+                                <p:cTn id="29" presetID="1" presetClass="entr" presetSubtype="0" fill="hold" grpId="0" nodeType="clickEffect">
+                                  <p:stCondLst>
+                                    <p:cond delay="0"/>
+                                  </p:stCondLst>
+                                  <p:childTnLst>
+                                    <p:set>
+                                      <p:cBhvr>
+                                        <p:cTn id="30" dur="1" fill="hold">
+                                          <p:stCondLst>
+                                            <p:cond delay="0"/>
+                                          </p:stCondLst>
+                                        </p:cTn>
+                                        <p:tgtEl>
+                                          <p:spTgt spid="5">
+                                            <p:txEl>
+                                              <p:pRg st="6" end="6"/>
+                                            </p:txEl>
+                                          </p:spTgt>
+                                        </p:tgtEl>
+                                        <p:attrNameLst>
+                                          <p:attrName>style.visibility</p:attrName>
+                                        </p:attrNameLst>
+                                      </p:cBhvr>
+                                      <p:to>
+                                        <p:strVal val="visible"/>
+                                      </p:to>
+                                    </p:set>
+                                  </p:childTnLst>
+                                </p:cTn>
+                              </p:par>
+                            </p:childTnLst>
+                          </p:cTn>
+                        </p:par>
+                      </p:childTnLst>
+                    </p:cTn>
+                  </p:par>
+                  <p:par>
+                    <p:cTn id="31" fill="hold">
+                      <p:stCondLst>
+                        <p:cond delay="indefinite"/>
+                      </p:stCondLst>
+                      <p:childTnLst>
+                        <p:par>
+                          <p:cTn id="32" fill="hold">
+                            <p:stCondLst>
+                              <p:cond delay="0"/>
+                            </p:stCondLst>
+                            <p:childTnLst>
+                              <p:par>
+                                <p:cTn id="33" presetID="1" presetClass="entr" presetSubtype="0" fill="hold" grpId="0" nodeType="clickEffect">
+                                  <p:stCondLst>
+                                    <p:cond delay="0"/>
+                                  </p:stCondLst>
+                                  <p:childTnLst>
+                                    <p:set>
+                                      <p:cBhvr>
+                                        <p:cTn id="34" dur="1" fill="hold">
+                                          <p:stCondLst>
+                                            <p:cond delay="0"/>
+                                          </p:stCondLst>
+                                        </p:cTn>
+                                        <p:tgtEl>
+                                          <p:spTgt spid="5">
+                                            <p:txEl>
+                                              <p:pRg st="7" end="7"/>
+                                            </p:txEl>
+                                          </p:spTgt>
+                                        </p:tgtEl>
+                                        <p:attrNameLst>
+                                          <p:attrName>style.visibility</p:attrName>
+                                        </p:attrNameLst>
+                                      </p:cBhvr>
+                                      <p:to>
+                                        <p:strVal val="visible"/>
+                                      </p:to>
+                                    </p:set>
+                                  </p:childTnLst>
+                                </p:cTn>
+                              </p:par>
+                            </p:childTnLst>
+                          </p:cTn>
+                        </p:par>
+                      </p:childTnLst>
+                    </p:cTn>
+                  </p:par>
+                  <p:par>
+                    <p:cTn id="35" fill="hold">
+                      <p:stCondLst>
+                        <p:cond delay="indefinite"/>
+                      </p:stCondLst>
+                      <p:childTnLst>
+                        <p:par>
+                          <p:cTn id="36" fill="hold">
+                            <p:stCondLst>
+                              <p:cond delay="0"/>
+                            </p:stCondLst>
+                            <p:childTnLst>
+                              <p:par>
+                                <p:cTn id="37" presetID="1" presetClass="entr" presetSubtype="0" fill="hold" grpId="0" nodeType="clickEffect">
+                                  <p:stCondLst>
+                                    <p:cond delay="0"/>
+                                  </p:stCondLst>
+                                  <p:childTnLst>
+                                    <p:set>
+                                      <p:cBhvr>
+                                        <p:cTn id="38" dur="1" fill="hold">
+                                          <p:stCondLst>
+                                            <p:cond delay="0"/>
+                                          </p:stCondLst>
+                                        </p:cTn>
+                                        <p:tgtEl>
+                                          <p:spTgt spid="5">
+                                            <p:txEl>
+                                              <p:pRg st="8" end="8"/>
+                                            </p:txEl>
+                                          </p:spTgt>
+                                        </p:tgtEl>
+                                        <p:attrNameLst>
+                                          <p:attrName>style.visibility</p:attrName>
+                                        </p:attrNameLst>
+                                      </p:cBhvr>
+                                      <p:to>
+                                        <p:strVal val="visible"/>
+                                      </p:to>
+                                    </p:set>
+                                  </p:childTnLst>
+                                </p:cTn>
+                              </p:par>
+                            </p:childTnLst>
+                          </p:cTn>
+                        </p:par>
+                      </p:childTnLst>
+                    </p:cTn>
+                  </p:par>
+                </p:childTnLst>
+              </p:cTn>
+              <p:prevCondLst>
+                <p:cond evt="onPrev" delay="0">
+                  <p:tgtEl>
+                    <p:sldTgt/>
+                  </p:tgtEl>
+                </p:cond>
+              </p:prevCondLst>
+              <p:nextCondLst>
+                <p:cond evt="onNext" delay="0">
+                  <p:tgtEl>
+                    <p:sldTgt/>
+                  </p:tgtEl>
+                </p:cond>
+              </p:nextCondLst>
+            </p:seq>
+          </p:childTnLst>
+        </p:cTn>
+      </p:par>
+    </p:tnLst>
+    <p:bldLst>
+      <p:bldP spid="5" grpId="0" uiExpand="1" build="p"/>
+    </p:bldLst>
+  </p:timing>
 </p:sld>
 </file>
 
@@ -36326,7 +38275,7 @@
             </a:pPr>
             <a:r>
               <a:rPr lang="en" dirty="0"/>
-              <a:t>	  						19 &gt; 32, however, so:</a:t>
+              <a:t>	  						32 &gt; 19, however, so:</a:t>
             </a:r>
           </a:p>
           <a:p>

</xml_diff>